<commit_message>
ppt and lecture notes
</commit_message>
<xml_diff>
--- a/Lecture_Notes/2 Data Visualization/Lecture_1_Data_Visualization.pptx
+++ b/Lecture_Notes/2 Data Visualization/Lecture_1_Data_Visualization.pptx
@@ -5,7 +5,7 @@
     <p:sldMasterId id="2147483648" r:id="rId1"/>
   </p:sldMasterIdLst>
   <p:notesMasterIdLst>
-    <p:notesMasterId r:id="rId20"/>
+    <p:notesMasterId r:id="rId21"/>
   </p:notesMasterIdLst>
   <p:sldIdLst>
     <p:sldId id="256" r:id="rId2"/>
@@ -18,14 +18,15 @@
     <p:sldId id="270" r:id="rId9"/>
     <p:sldId id="271" r:id="rId10"/>
     <p:sldId id="272" r:id="rId11"/>
-    <p:sldId id="273" r:id="rId12"/>
-    <p:sldId id="274" r:id="rId13"/>
-    <p:sldId id="275" r:id="rId14"/>
-    <p:sldId id="276" r:id="rId15"/>
-    <p:sldId id="263" r:id="rId16"/>
-    <p:sldId id="265" r:id="rId17"/>
-    <p:sldId id="277" r:id="rId18"/>
-    <p:sldId id="267" r:id="rId19"/>
+    <p:sldId id="278" r:id="rId12"/>
+    <p:sldId id="273" r:id="rId13"/>
+    <p:sldId id="274" r:id="rId14"/>
+    <p:sldId id="275" r:id="rId15"/>
+    <p:sldId id="276" r:id="rId16"/>
+    <p:sldId id="263" r:id="rId17"/>
+    <p:sldId id="265" r:id="rId18"/>
+    <p:sldId id="277" r:id="rId19"/>
+    <p:sldId id="267" r:id="rId20"/>
   </p:sldIdLst>
   <p:sldSz cx="13004800" cy="9753600"/>
   <p:notesSz cx="6858000" cy="9144000"/>
@@ -327,6 +328,11 @@
       </a:defRPr>
     </a:lvl9pPr>
   </p:defaultTextStyle>
+  <p:extLst>
+    <p:ext uri="{EFAFB233-063F-42B5-8137-9DF3F51BA10A}">
+      <p15:sldGuideLst xmlns:p15="http://schemas.microsoft.com/office/powerpoint/2012/main"/>
+    </p:ext>
+  </p:extLst>
 </p:presentation>
 </file>
 
@@ -2445,7 +2451,7 @@
           </a:ln>
           <a:extLst>
             <a:ext uri="{C572A759-6A51-4108-AA02-DFA0A04FC94B}">
-              <ma14:wrappingTextBoxFlag xmlns:ma14="http://schemas.microsoft.com/office/mac/drawingml/2011/main" xmlns="" val="1"/>
+              <ma14:wrappingTextBoxFlag xmlns="" xmlns:ma14="http://schemas.microsoft.com/office/mac/drawingml/2011/main" val="1"/>
             </a:ext>
           </a:extLst>
         </p:spPr>
@@ -2484,7 +2490,7 @@
           </a:ln>
           <a:extLst>
             <a:ext uri="{C572A759-6A51-4108-AA02-DFA0A04FC94B}">
-              <ma14:wrappingTextBoxFlag xmlns:ma14="http://schemas.microsoft.com/office/mac/drawingml/2011/main" xmlns="" val="1"/>
+              <ma14:wrappingTextBoxFlag xmlns="" xmlns:ma14="http://schemas.microsoft.com/office/mac/drawingml/2011/main" val="1"/>
             </a:ext>
           </a:extLst>
         </p:spPr>
@@ -3575,6 +3581,101 @@
       </p:grpSpPr>
       <p:sp>
         <p:nvSpPr>
+          <p:cNvPr id="2" name="Title 1">
+            <a:extLst>
+              <a:ext uri="{FF2B5EF4-FFF2-40B4-BE49-F238E27FC236}">
+                <a16:creationId xmlns:a16="http://schemas.microsoft.com/office/drawing/2014/main" id="{D5735195-0EF9-4BF7-B341-258488A6D283}"/>
+              </a:ext>
+            </a:extLst>
+          </p:cNvPr>
+          <p:cNvSpPr>
+            <a:spLocks noGrp="1"/>
+          </p:cNvSpPr>
+          <p:nvPr>
+            <p:ph type="title"/>
+          </p:nvPr>
+        </p:nvSpPr>
+        <p:spPr/>
+        <p:txBody>
+          <a:bodyPr/>
+          <a:lstStyle/>
+          <a:p>
+            <a:r>
+              <a:rPr lang="en-US" dirty="0"/>
+              <a:t>See the trend</a:t>
+            </a:r>
+          </a:p>
+        </p:txBody>
+      </p:sp>
+      <p:pic>
+        <p:nvPicPr>
+          <p:cNvPr id="5" name="Picture 4">
+            <a:extLst>
+              <a:ext uri="{FF2B5EF4-FFF2-40B4-BE49-F238E27FC236}">
+                <a16:creationId xmlns:a16="http://schemas.microsoft.com/office/drawing/2014/main" id="{7EBF1456-E00D-4C15-B181-E85BE6F3BABA}"/>
+              </a:ext>
+            </a:extLst>
+          </p:cNvPr>
+          <p:cNvPicPr>
+            <a:picLocks noChangeAspect="1"/>
+          </p:cNvPicPr>
+          <p:nvPr/>
+        </p:nvPicPr>
+        <p:blipFill>
+          <a:blip r:embed="rId2">
+            <a:extLst>
+              <a:ext uri="{28A0092B-C50C-407E-A947-70E740481C1C}">
+                <a14:useLocalDpi xmlns:a14="http://schemas.microsoft.com/office/drawing/2010/main" val="0"/>
+              </a:ext>
+            </a:extLst>
+          </a:blip>
+          <a:stretch>
+            <a:fillRect/>
+          </a:stretch>
+        </p:blipFill>
+        <p:spPr>
+          <a:xfrm>
+            <a:off x="2445098" y="3087609"/>
+            <a:ext cx="8494826" cy="5387317"/>
+          </a:xfrm>
+          <a:prstGeom prst="rect">
+            <a:avLst/>
+          </a:prstGeom>
+        </p:spPr>
+      </p:pic>
+    </p:spTree>
+    <p:extLst>
+      <p:ext uri="{BB962C8B-B14F-4D97-AF65-F5344CB8AC3E}">
+        <p14:creationId xmlns:p14="http://schemas.microsoft.com/office/powerpoint/2010/main" val="1813835912"/>
+      </p:ext>
+    </p:extLst>
+  </p:cSld>
+  <p:clrMapOvr>
+    <a:masterClrMapping/>
+  </p:clrMapOvr>
+  <p:transition spd="med"/>
+</p:sld>
+</file>
+
+<file path=ppt/slides/slide12.xml><?xml version="1.0" encoding="utf-8"?>
+<p:sld xmlns:a="http://schemas.openxmlformats.org/drawingml/2006/main" xmlns:r="http://schemas.openxmlformats.org/officeDocument/2006/relationships" xmlns:p="http://schemas.openxmlformats.org/presentationml/2006/main">
+  <p:cSld>
+    <p:spTree>
+      <p:nvGrpSpPr>
+        <p:cNvPr id="1" name=""/>
+        <p:cNvGrpSpPr/>
+        <p:nvPr/>
+      </p:nvGrpSpPr>
+      <p:grpSpPr>
+        <a:xfrm>
+          <a:off x="0" y="0"/>
+          <a:ext cx="0" cy="0"/>
+          <a:chOff x="0" y="0"/>
+          <a:chExt cx="0" cy="0"/>
+        </a:xfrm>
+      </p:grpSpPr>
+      <p:sp>
+        <p:nvSpPr>
           <p:cNvPr id="185" name="Shape 185"/>
           <p:cNvSpPr>
             <a:spLocks noGrp="1"/>
@@ -3673,7 +3774,7 @@
 </p:sld>
 </file>
 
-<file path=ppt/slides/slide12.xml><?xml version="1.0" encoding="utf-8"?>
+<file path=ppt/slides/slide13.xml><?xml version="1.0" encoding="utf-8"?>
 <p:sld xmlns:a="http://schemas.openxmlformats.org/drawingml/2006/main" xmlns:r="http://schemas.openxmlformats.org/officeDocument/2006/relationships" xmlns:p="http://schemas.openxmlformats.org/presentationml/2006/main">
   <p:cSld>
     <p:spTree>
@@ -3767,7 +3868,7 @@
 </p:sld>
 </file>
 
-<file path=ppt/slides/slide13.xml><?xml version="1.0" encoding="utf-8"?>
+<file path=ppt/slides/slide14.xml><?xml version="1.0" encoding="utf-8"?>
 <p:sld xmlns:a="http://schemas.openxmlformats.org/drawingml/2006/main" xmlns:r="http://schemas.openxmlformats.org/officeDocument/2006/relationships" xmlns:p="http://schemas.openxmlformats.org/presentationml/2006/main">
   <p:cSld>
     <p:spTree>
@@ -3861,7 +3962,7 @@
 </p:sld>
 </file>
 
-<file path=ppt/slides/slide14.xml><?xml version="1.0" encoding="utf-8"?>
+<file path=ppt/slides/slide15.xml><?xml version="1.0" encoding="utf-8"?>
 <p:sld xmlns:a="http://schemas.openxmlformats.org/drawingml/2006/main" xmlns:r="http://schemas.openxmlformats.org/officeDocument/2006/relationships" xmlns:p="http://schemas.openxmlformats.org/presentationml/2006/main">
   <p:cSld>
     <p:spTree>
@@ -3955,7 +4056,7 @@
 </p:sld>
 </file>
 
-<file path=ppt/slides/slide15.xml><?xml version="1.0" encoding="utf-8"?>
+<file path=ppt/slides/slide16.xml><?xml version="1.0" encoding="utf-8"?>
 <p:sld xmlns:a="http://schemas.openxmlformats.org/drawingml/2006/main" xmlns:r="http://schemas.openxmlformats.org/officeDocument/2006/relationships" xmlns:p="http://schemas.openxmlformats.org/presentationml/2006/main">
   <p:cSld>
     <p:spTree>
@@ -4057,105 +4158,6 @@
             <a:r>
               <a:rPr lang="en-US" dirty="0"/>
               <a:t>Excel</a:t>
-            </a:r>
-          </a:p>
-        </p:txBody>
-      </p:sp>
-    </p:spTree>
-  </p:cSld>
-  <p:clrMapOvr>
-    <a:masterClrMapping/>
-  </p:clrMapOvr>
-  <p:transition spd="slow"/>
-</p:sld>
-</file>
-
-<file path=ppt/slides/slide16.xml><?xml version="1.0" encoding="utf-8"?>
-<p:sld xmlns:a="http://schemas.openxmlformats.org/drawingml/2006/main" xmlns:r="http://schemas.openxmlformats.org/officeDocument/2006/relationships" xmlns:p="http://schemas.openxmlformats.org/presentationml/2006/main">
-  <p:cSld>
-    <p:spTree>
-      <p:nvGrpSpPr>
-        <p:cNvPr id="1" name=""/>
-        <p:cNvGrpSpPr/>
-        <p:nvPr/>
-      </p:nvGrpSpPr>
-      <p:grpSpPr>
-        <a:xfrm>
-          <a:off x="0" y="0"/>
-          <a:ext cx="0" cy="0"/>
-          <a:chOff x="0" y="0"/>
-          <a:chExt cx="0" cy="0"/>
-        </a:xfrm>
-      </p:grpSpPr>
-      <p:sp>
-        <p:nvSpPr>
-          <p:cNvPr id="191" name="Shape 191"/>
-          <p:cNvSpPr>
-            <a:spLocks noGrp="1"/>
-          </p:cNvSpPr>
-          <p:nvPr>
-            <p:ph type="title"/>
-          </p:nvPr>
-        </p:nvSpPr>
-        <p:spPr>
-          <a:prstGeom prst="rect">
-            <a:avLst/>
-          </a:prstGeom>
-        </p:spPr>
-        <p:txBody>
-          <a:bodyPr/>
-          <a:lstStyle>
-            <a:lvl1pPr defTabSz="490727">
-              <a:defRPr sz="6700"/>
-            </a:lvl1pPr>
-          </a:lstStyle>
-          <a:p>
-            <a:r>
-              <a:rPr lang="en-US" dirty="0"/>
-              <a:t>Toy Problem</a:t>
-            </a:r>
-            <a:endParaRPr dirty="0"/>
-          </a:p>
-        </p:txBody>
-      </p:sp>
-      <p:sp>
-        <p:nvSpPr>
-          <p:cNvPr id="6" name="Shape 186">
-            <a:extLst>
-              <a:ext uri="{FF2B5EF4-FFF2-40B4-BE49-F238E27FC236}">
-                <a16:creationId xmlns:a16="http://schemas.microsoft.com/office/drawing/2014/main" id="{BF676300-CBBD-460C-8A51-0BD490AC8C22}"/>
-              </a:ext>
-            </a:extLst>
-          </p:cNvPr>
-          <p:cNvSpPr>
-            <a:spLocks noGrp="1"/>
-          </p:cNvSpPr>
-          <p:nvPr>
-            <p:ph type="body" idx="1"/>
-          </p:nvPr>
-        </p:nvSpPr>
-        <p:spPr>
-          <a:xfrm>
-            <a:off x="952500" y="2603500"/>
-            <a:ext cx="11099800" cy="6286500"/>
-          </a:xfrm>
-          <a:prstGeom prst="rect">
-            <a:avLst/>
-          </a:prstGeom>
-        </p:spPr>
-        <p:txBody>
-          <a:bodyPr/>
-          <a:lstStyle/>
-          <a:p>
-            <a:r>
-              <a:rPr lang="en-US" dirty="0"/>
-              <a:t>Try to create a scatter plot between two variables you are interested</a:t>
-            </a:r>
-          </a:p>
-          <a:p>
-            <a:r>
-              <a:rPr lang="en-US" dirty="0"/>
-              <a:t>Try to find the distribution of a variable that doesn’t follow normal distribution</a:t>
             </a:r>
           </a:p>
         </p:txBody>
@@ -4211,6 +4213,105 @@
           <a:p>
             <a:r>
               <a:rPr lang="en-US" dirty="0"/>
+              <a:t>Toy Problem</a:t>
+            </a:r>
+            <a:endParaRPr dirty="0"/>
+          </a:p>
+        </p:txBody>
+      </p:sp>
+      <p:sp>
+        <p:nvSpPr>
+          <p:cNvPr id="6" name="Shape 186">
+            <a:extLst>
+              <a:ext uri="{FF2B5EF4-FFF2-40B4-BE49-F238E27FC236}">
+                <a16:creationId xmlns:a16="http://schemas.microsoft.com/office/drawing/2014/main" id="{BF676300-CBBD-460C-8A51-0BD490AC8C22}"/>
+              </a:ext>
+            </a:extLst>
+          </p:cNvPr>
+          <p:cNvSpPr>
+            <a:spLocks noGrp="1"/>
+          </p:cNvSpPr>
+          <p:nvPr>
+            <p:ph type="body" idx="1"/>
+          </p:nvPr>
+        </p:nvSpPr>
+        <p:spPr>
+          <a:xfrm>
+            <a:off x="952500" y="2603500"/>
+            <a:ext cx="11099800" cy="6286500"/>
+          </a:xfrm>
+          <a:prstGeom prst="rect">
+            <a:avLst/>
+          </a:prstGeom>
+        </p:spPr>
+        <p:txBody>
+          <a:bodyPr/>
+          <a:lstStyle/>
+          <a:p>
+            <a:r>
+              <a:rPr lang="en-US" dirty="0"/>
+              <a:t>Try to create a scatter plot between two variables you are interested</a:t>
+            </a:r>
+          </a:p>
+          <a:p>
+            <a:r>
+              <a:rPr lang="en-US" dirty="0"/>
+              <a:t>Try to find the distribution of a variable that doesn’t follow normal distribution</a:t>
+            </a:r>
+          </a:p>
+        </p:txBody>
+      </p:sp>
+    </p:spTree>
+  </p:cSld>
+  <p:clrMapOvr>
+    <a:masterClrMapping/>
+  </p:clrMapOvr>
+  <p:transition spd="slow"/>
+</p:sld>
+</file>
+
+<file path=ppt/slides/slide18.xml><?xml version="1.0" encoding="utf-8"?>
+<p:sld xmlns:a="http://schemas.openxmlformats.org/drawingml/2006/main" xmlns:r="http://schemas.openxmlformats.org/officeDocument/2006/relationships" xmlns:p="http://schemas.openxmlformats.org/presentationml/2006/main">
+  <p:cSld>
+    <p:spTree>
+      <p:nvGrpSpPr>
+        <p:cNvPr id="1" name=""/>
+        <p:cNvGrpSpPr/>
+        <p:nvPr/>
+      </p:nvGrpSpPr>
+      <p:grpSpPr>
+        <a:xfrm>
+          <a:off x="0" y="0"/>
+          <a:ext cx="0" cy="0"/>
+          <a:chOff x="0" y="0"/>
+          <a:chExt cx="0" cy="0"/>
+        </a:xfrm>
+      </p:grpSpPr>
+      <p:sp>
+        <p:nvSpPr>
+          <p:cNvPr id="191" name="Shape 191"/>
+          <p:cNvSpPr>
+            <a:spLocks noGrp="1"/>
+          </p:cNvSpPr>
+          <p:nvPr>
+            <p:ph type="title"/>
+          </p:nvPr>
+        </p:nvSpPr>
+        <p:spPr>
+          <a:prstGeom prst="rect">
+            <a:avLst/>
+          </a:prstGeom>
+        </p:spPr>
+        <p:txBody>
+          <a:bodyPr/>
+          <a:lstStyle>
+            <a:lvl1pPr defTabSz="490727">
+              <a:defRPr sz="6700"/>
+            </a:lvl1pPr>
+          </a:lstStyle>
+          <a:p>
+            <a:r>
+              <a:rPr lang="en-US" dirty="0"/>
               <a:t>Use Data Visualization to Observe Benz Dataset</a:t>
             </a:r>
             <a:endParaRPr dirty="0"/>
@@ -4272,7 +4373,7 @@
 </p:sld>
 </file>
 
-<file path=ppt/slides/slide18.xml><?xml version="1.0" encoding="utf-8"?>
+<file path=ppt/slides/slide19.xml><?xml version="1.0" encoding="utf-8"?>
 <p:sld xmlns:a="http://schemas.openxmlformats.org/drawingml/2006/main" xmlns:r="http://schemas.openxmlformats.org/officeDocument/2006/relationships" xmlns:p="http://schemas.openxmlformats.org/presentationml/2006/main">
   <p:cSld>
     <p:spTree>
@@ -4792,7 +4893,7 @@
           </a:ln>
           <a:extLst>
             <a:ext uri="{C572A759-6A51-4108-AA02-DFA0A04FC94B}">
-              <ma14:wrappingTextBoxFlag xmlns:ma14="http://schemas.microsoft.com/office/mac/drawingml/2011/main" xmlns="" val="1"/>
+              <ma14:wrappingTextBoxFlag xmlns="" xmlns:ma14="http://schemas.microsoft.com/office/mac/drawingml/2011/main" val="1"/>
             </a:ext>
           </a:extLst>
         </p:spPr>
@@ -5414,6 +5515,12 @@
             <a:r>
               <a:rPr lang="en-US" dirty="0"/>
               <a:t>Distribution in a wide range</a:t>
+            </a:r>
+          </a:p>
+          <a:p>
+            <a:r>
+              <a:rPr lang="en-US" dirty="0"/>
+              <a:t>See the trend</a:t>
             </a:r>
           </a:p>
           <a:p>

</xml_diff>